<commit_message>
gonna be a late game
</commit_message>
<xml_diff>
--- a/potential_field_real_full.pptx
+++ b/potential_field_real_full.pptx
@@ -104,6 +104,11 @@
       </a:defRPr>
     </a:lvl9pPr>
   </p:defaultTextStyle>
+  <p:extLst>
+    <p:ext uri="{EFAFB233-063F-42B5-8137-9DF3F51BA10A}">
+      <p15:sldGuideLst xmlns:p15="http://schemas.microsoft.com/office/powerpoint/2012/main"/>
+    </p:ext>
+  </p:extLst>
 </p:presentation>
 </file>
 
@@ -3037,8 +3042,8 @@
         </p:blipFill>
         <p:spPr>
           <a:xfrm>
-            <a:off x="607244" y="4655949"/>
-            <a:ext cx="5980818" cy="4485614"/>
+            <a:off x="2578919" y="4987141"/>
+            <a:ext cx="5134337" cy="3850753"/>
           </a:xfrm>
           <a:prstGeom prst="rect">
             <a:avLst/>
@@ -3072,8 +3077,8 @@
         </p:blipFill>
         <p:spPr>
           <a:xfrm>
-            <a:off x="7139383" y="4649011"/>
-            <a:ext cx="5990068" cy="4492552"/>
+            <a:off x="8308750" y="4987141"/>
+            <a:ext cx="5142278" cy="3856709"/>
           </a:xfrm>
           <a:prstGeom prst="rect">
             <a:avLst/>
@@ -3095,8 +3100,8 @@
         </p:nvCxnSpPr>
         <p:spPr>
           <a:xfrm flipV="1">
-            <a:off x="3597653" y="3386138"/>
-            <a:ext cx="7117972" cy="1269811"/>
+            <a:off x="5146088" y="3402419"/>
+            <a:ext cx="5529000" cy="1584722"/>
           </a:xfrm>
           <a:prstGeom prst="line">
             <a:avLst/>
@@ -3134,8 +3139,8 @@
         </p:nvCxnSpPr>
         <p:spPr>
           <a:xfrm flipV="1">
-            <a:off x="10134417" y="2594344"/>
-            <a:ext cx="2071760" cy="2054667"/>
+            <a:off x="10879889" y="2594344"/>
+            <a:ext cx="1283758" cy="2392797"/>
           </a:xfrm>
           <a:prstGeom prst="line">
             <a:avLst/>

</xml_diff>